<commit_message>
Oprava chyby v prezentaci
</commit_message>
<xml_diff>
--- a/Documentation/USB RAID pole.pptx
+++ b/Documentation/USB RAID pole.pptx
@@ -6095,10 +6095,10 @@
             </a:lnSpc>
           </a:pPr>
           <a:r>
-            <a:rPr lang="cs-CZ"/>
+            <a:rPr lang="cs-CZ" dirty="0"/>
             <a:t>Versatilní webová aplikace</a:t>
           </a:r>
-          <a:endParaRPr lang="en-US"/>
+          <a:endParaRPr lang="en-US" dirty="0"/>
         </a:p>
       </dgm:t>
     </dgm:pt>
@@ -9701,10 +9701,10 @@
             <a:buNone/>
           </a:pPr>
           <a:r>
-            <a:rPr lang="cs-CZ" sz="1200" kern="1200"/>
+            <a:rPr lang="cs-CZ" sz="1200" kern="1200" dirty="0"/>
             <a:t>Versatilní webová aplikace</a:t>
           </a:r>
-          <a:endParaRPr lang="en-US" sz="1200" kern="1200"/>
+          <a:endParaRPr lang="en-US" sz="1200" kern="1200" dirty="0"/>
         </a:p>
       </dsp:txBody>
       <dsp:txXfrm>
@@ -21387,7 +21387,7 @@
           <a:p>
             <a:fld id="{D208048B-57AF-4F53-BC84-8E0A1033FBEC}" type="datetimeFigureOut">
               <a:rPr lang="en-US" smtClean="0"/>
-              <a:t>5/19/2025</a:t>
+              <a:t>5/20/2025</a:t>
             </a:fld>
             <a:endParaRPr lang="en-US"/>
           </a:p>
@@ -21585,7 +21585,7 @@
           <a:p>
             <a:fld id="{D208048B-57AF-4F53-BC84-8E0A1033FBEC}" type="datetimeFigureOut">
               <a:rPr lang="en-US" smtClean="0"/>
-              <a:t>5/19/2025</a:t>
+              <a:t>5/20/2025</a:t>
             </a:fld>
             <a:endParaRPr lang="en-US"/>
           </a:p>
@@ -23122,7 +23122,7 @@
           <a:p>
             <a:fld id="{D208048B-57AF-4F53-BC84-8E0A1033FBEC}" type="datetimeFigureOut">
               <a:rPr lang="en-US" smtClean="0"/>
-              <a:t>5/19/2025</a:t>
+              <a:t>5/20/2025</a:t>
             </a:fld>
             <a:endParaRPr lang="en-US"/>
           </a:p>
@@ -23322,7 +23322,7 @@
           <a:p>
             <a:fld id="{D208048B-57AF-4F53-BC84-8E0A1033FBEC}" type="datetimeFigureOut">
               <a:rPr lang="en-US" smtClean="0"/>
-              <a:t>5/19/2025</a:t>
+              <a:t>5/20/2025</a:t>
             </a:fld>
             <a:endParaRPr lang="en-US"/>
           </a:p>
@@ -23600,7 +23600,7 @@
           <a:p>
             <a:fld id="{D208048B-57AF-4F53-BC84-8E0A1033FBEC}" type="datetimeFigureOut">
               <a:rPr lang="en-US" smtClean="0"/>
-              <a:t>5/19/2025</a:t>
+              <a:t>5/20/2025</a:t>
             </a:fld>
             <a:endParaRPr lang="en-US"/>
           </a:p>
@@ -24578,7 +24578,7 @@
           <a:p>
             <a:fld id="{D208048B-57AF-4F53-BC84-8E0A1033FBEC}" type="datetimeFigureOut">
               <a:rPr lang="en-US" smtClean="0"/>
-              <a:t>5/19/2025</a:t>
+              <a:t>5/20/2025</a:t>
             </a:fld>
             <a:endParaRPr lang="en-US"/>
           </a:p>
@@ -25698,7 +25698,7 @@
           <a:p>
             <a:fld id="{D208048B-57AF-4F53-BC84-8E0A1033FBEC}" type="datetimeFigureOut">
               <a:rPr lang="en-US" smtClean="0"/>
-              <a:t>5/19/2025</a:t>
+              <a:t>5/20/2025</a:t>
             </a:fld>
             <a:endParaRPr lang="en-US"/>
           </a:p>
@@ -25845,7 +25845,7 @@
           <a:p>
             <a:fld id="{D208048B-57AF-4F53-BC84-8E0A1033FBEC}" type="datetimeFigureOut">
               <a:rPr lang="en-US" smtClean="0"/>
-              <a:t>5/19/2025</a:t>
+              <a:t>5/20/2025</a:t>
             </a:fld>
             <a:endParaRPr lang="en-US"/>
           </a:p>
@@ -25958,7 +25958,7 @@
           <a:p>
             <a:fld id="{D208048B-57AF-4F53-BC84-8E0A1033FBEC}" type="datetimeFigureOut">
               <a:rPr lang="en-US" smtClean="0"/>
-              <a:t>5/19/2025</a:t>
+              <a:t>5/20/2025</a:t>
             </a:fld>
             <a:endParaRPr lang="en-US"/>
           </a:p>
@@ -27604,7 +27604,7 @@
           <a:p>
             <a:fld id="{D208048B-57AF-4F53-BC84-8E0A1033FBEC}" type="datetimeFigureOut">
               <a:rPr lang="en-US" smtClean="0"/>
-              <a:t>5/19/2025</a:t>
+              <a:t>5/20/2025</a:t>
             </a:fld>
             <a:endParaRPr lang="en-US"/>
           </a:p>
@@ -29242,7 +29242,7 @@
           <a:p>
             <a:fld id="{D208048B-57AF-4F53-BC84-8E0A1033FBEC}" type="datetimeFigureOut">
               <a:rPr lang="en-US" smtClean="0"/>
-              <a:t>5/19/2025</a:t>
+              <a:t>5/20/2025</a:t>
             </a:fld>
             <a:endParaRPr lang="en-US"/>
           </a:p>
@@ -30165,7 +30165,7 @@
             <a:fld id="{D208048B-57AF-4F53-BC84-8E0A1033FBEC}" type="datetimeFigureOut">
               <a:rPr lang="en-US" smtClean="0"/>
               <a:pPr/>
-              <a:t>5/19/2025</a:t>
+              <a:t>5/20/2025</a:t>
             </a:fld>
             <a:endParaRPr lang="en-US" dirty="0"/>
           </a:p>
@@ -54665,7 +54665,7 @@
           <a:p>
             <a:r>
               <a:rPr lang="cs-CZ" dirty="0"/>
-              <a:t>Použití </a:t>
+              <a:t>Použité </a:t>
             </a:r>
             <a:r>
               <a:rPr lang="cs-CZ" dirty="0" err="1"/>

</xml_diff>